<commit_message>
New poster per Dr. Nicholson's wishes
</commit_message>
<xml_diff>
--- a/docs/poster/CSCI-4805-froogal-poster-first-draft-nov-14.pptx
+++ b/docs/poster/CSCI-4805-froogal-poster-first-draft-nov-14.pptx
@@ -197,7 +197,7 @@
           <a:p>
             <a:fld id="{64ED9595-0AE4-4B15-B393-D0F1DD0EB94B}" type="datetimeFigureOut">
               <a:rPr lang="en-US" smtClean="0"/>
-              <a:t>11/13/2022</a:t>
+              <a:t>11/14/22</a:t>
             </a:fld>
             <a:endParaRPr lang="en-US"/>
           </a:p>
@@ -684,7 +684,7 @@
           <a:p>
             <a:fld id="{41C03D7F-B796-4B92-B0C7-6D4C9CC8C787}" type="datetimeFigureOut">
               <a:rPr lang="en-US" smtClean="0"/>
-              <a:t>11/13/2022</a:t>
+              <a:t>11/14/22</a:t>
             </a:fld>
             <a:endParaRPr lang="en-US"/>
           </a:p>
@@ -854,7 +854,7 @@
           <a:p>
             <a:fld id="{41C03D7F-B796-4B92-B0C7-6D4C9CC8C787}" type="datetimeFigureOut">
               <a:rPr lang="en-US" smtClean="0"/>
-              <a:t>11/13/2022</a:t>
+              <a:t>11/14/22</a:t>
             </a:fld>
             <a:endParaRPr lang="en-US"/>
           </a:p>
@@ -1034,7 +1034,7 @@
           <a:p>
             <a:fld id="{41C03D7F-B796-4B92-B0C7-6D4C9CC8C787}" type="datetimeFigureOut">
               <a:rPr lang="en-US" smtClean="0"/>
-              <a:t>11/13/2022</a:t>
+              <a:t>11/14/22</a:t>
             </a:fld>
             <a:endParaRPr lang="en-US"/>
           </a:p>
@@ -1204,7 +1204,7 @@
           <a:p>
             <a:fld id="{41C03D7F-B796-4B92-B0C7-6D4C9CC8C787}" type="datetimeFigureOut">
               <a:rPr lang="en-US" smtClean="0"/>
-              <a:t>11/13/2022</a:t>
+              <a:t>11/14/22</a:t>
             </a:fld>
             <a:endParaRPr lang="en-US"/>
           </a:p>
@@ -1448,7 +1448,7 @@
           <a:p>
             <a:fld id="{41C03D7F-B796-4B92-B0C7-6D4C9CC8C787}" type="datetimeFigureOut">
               <a:rPr lang="en-US" smtClean="0"/>
-              <a:t>11/13/2022</a:t>
+              <a:t>11/14/22</a:t>
             </a:fld>
             <a:endParaRPr lang="en-US"/>
           </a:p>
@@ -1680,7 +1680,7 @@
           <a:p>
             <a:fld id="{41C03D7F-B796-4B92-B0C7-6D4C9CC8C787}" type="datetimeFigureOut">
               <a:rPr lang="en-US" smtClean="0"/>
-              <a:t>11/13/2022</a:t>
+              <a:t>11/14/22</a:t>
             </a:fld>
             <a:endParaRPr lang="en-US"/>
           </a:p>
@@ -2047,7 +2047,7 @@
           <a:p>
             <a:fld id="{41C03D7F-B796-4B92-B0C7-6D4C9CC8C787}" type="datetimeFigureOut">
               <a:rPr lang="en-US" smtClean="0"/>
-              <a:t>11/13/2022</a:t>
+              <a:t>11/14/22</a:t>
             </a:fld>
             <a:endParaRPr lang="en-US"/>
           </a:p>
@@ -2165,7 +2165,7 @@
           <a:p>
             <a:fld id="{41C03D7F-B796-4B92-B0C7-6D4C9CC8C787}" type="datetimeFigureOut">
               <a:rPr lang="en-US" smtClean="0"/>
-              <a:t>11/13/2022</a:t>
+              <a:t>11/14/22</a:t>
             </a:fld>
             <a:endParaRPr lang="en-US"/>
           </a:p>
@@ -2260,7 +2260,7 @@
           <a:p>
             <a:fld id="{41C03D7F-B796-4B92-B0C7-6D4C9CC8C787}" type="datetimeFigureOut">
               <a:rPr lang="en-US" smtClean="0"/>
-              <a:t>11/13/2022</a:t>
+              <a:t>11/14/22</a:t>
             </a:fld>
             <a:endParaRPr lang="en-US"/>
           </a:p>
@@ -2537,7 +2537,7 @@
           <a:p>
             <a:fld id="{41C03D7F-B796-4B92-B0C7-6D4C9CC8C787}" type="datetimeFigureOut">
               <a:rPr lang="en-US" smtClean="0"/>
-              <a:t>11/13/2022</a:t>
+              <a:t>11/14/22</a:t>
             </a:fld>
             <a:endParaRPr lang="en-US"/>
           </a:p>
@@ -2794,7 +2794,7 @@
           <a:p>
             <a:fld id="{41C03D7F-B796-4B92-B0C7-6D4C9CC8C787}" type="datetimeFigureOut">
               <a:rPr lang="en-US" smtClean="0"/>
-              <a:t>11/13/2022</a:t>
+              <a:t>11/14/22</a:t>
             </a:fld>
             <a:endParaRPr lang="en-US"/>
           </a:p>
@@ -3007,7 +3007,7 @@
           <a:p>
             <a:fld id="{41C03D7F-B796-4B92-B0C7-6D4C9CC8C787}" type="datetimeFigureOut">
               <a:rPr lang="en-US" smtClean="0"/>
-              <a:t>11/13/2022</a:t>
+              <a:t>11/14/22</a:t>
             </a:fld>
             <a:endParaRPr lang="en-US"/>
           </a:p>
@@ -3914,7 +3914,7 @@
             </a:r>
             <a:r>
               <a:rPr lang="en-US" sz="3200" dirty="0"/>
-              <a:t> development, the team’s goal has been to release a functional Minimum Viable Product (MVP). The main focuses of the MVP have been: architecting the app, creating documentation, structuring the database, establishing correct database calls via Firebase API , and creating a concrete UI that displays all the correct user information and financial insights. </a:t>
+              <a:t> development, the team’s goal has been to release a functional Minimum Viable Product (MVP). The main focuses of the MVP have been architecting the app, creating documentation, structuring the database, establishing correct database calls via Firebase API , and creating a concrete UI that displays all the correct user information and financial insights. </a:t>
             </a:r>
           </a:p>
           <a:p>
@@ -4534,7 +4534,7 @@
         </p:blipFill>
         <p:spPr>
           <a:xfrm>
-            <a:off x="929323" y="7021899"/>
+            <a:off x="918067" y="6400800"/>
             <a:ext cx="18140580" cy="10117269"/>
           </a:xfrm>
           <a:prstGeom prst="rect">
@@ -4682,6 +4682,9 @@
           <a:prstGeom prst="rect">
             <a:avLst/>
           </a:prstGeom>
+          <a:ln>
+            <a:noFill/>
+          </a:ln>
         </p:spPr>
         <p:style>
           <a:lnRef idx="2">
@@ -4760,6 +4763,12 @@
           <a:prstGeom prst="rect">
             <a:avLst/>
           </a:prstGeom>
+          <a:solidFill>
+            <a:schemeClr val="bg1"/>
+          </a:solidFill>
+          <a:ln>
+            <a:noFill/>
+          </a:ln>
         </p:spPr>
         <p:style>
           <a:lnRef idx="2">
@@ -4898,7 +4907,7 @@
         </p:nvSpPr>
         <p:spPr>
           <a:xfrm>
-            <a:off x="929323" y="6250693"/>
+            <a:off x="929323" y="16929023"/>
             <a:ext cx="18129324" cy="584775"/>
           </a:xfrm>
           <a:prstGeom prst="rect">

</xml_diff>